<commit_message>
change menu color and first card color
</commit_message>
<xml_diff>
--- a/logo.pptx
+++ b/logo.pptx
@@ -243,7 +243,7 @@
           <a:p>
             <a:fld id="{9C17CDB5-7EC3-4DB1-8593-D6DC3761AE5D}" type="datetimeFigureOut">
               <a:rPr lang="es-ES" smtClean="0"/>
-              <a:t>23/01/2019</a:t>
+              <a:t>27/01/2019</a:t>
             </a:fld>
             <a:endParaRPr lang="es-ES"/>
           </a:p>
@@ -413,7 +413,7 @@
           <a:p>
             <a:fld id="{9C17CDB5-7EC3-4DB1-8593-D6DC3761AE5D}" type="datetimeFigureOut">
               <a:rPr lang="es-ES" smtClean="0"/>
-              <a:t>23/01/2019</a:t>
+              <a:t>27/01/2019</a:t>
             </a:fld>
             <a:endParaRPr lang="es-ES"/>
           </a:p>
@@ -593,7 +593,7 @@
           <a:p>
             <a:fld id="{9C17CDB5-7EC3-4DB1-8593-D6DC3761AE5D}" type="datetimeFigureOut">
               <a:rPr lang="es-ES" smtClean="0"/>
-              <a:t>23/01/2019</a:t>
+              <a:t>27/01/2019</a:t>
             </a:fld>
             <a:endParaRPr lang="es-ES"/>
           </a:p>
@@ -763,7 +763,7 @@
           <a:p>
             <a:fld id="{9C17CDB5-7EC3-4DB1-8593-D6DC3761AE5D}" type="datetimeFigureOut">
               <a:rPr lang="es-ES" smtClean="0"/>
-              <a:t>23/01/2019</a:t>
+              <a:t>27/01/2019</a:t>
             </a:fld>
             <a:endParaRPr lang="es-ES"/>
           </a:p>
@@ -1009,7 +1009,7 @@
           <a:p>
             <a:fld id="{9C17CDB5-7EC3-4DB1-8593-D6DC3761AE5D}" type="datetimeFigureOut">
               <a:rPr lang="es-ES" smtClean="0"/>
-              <a:t>23/01/2019</a:t>
+              <a:t>27/01/2019</a:t>
             </a:fld>
             <a:endParaRPr lang="es-ES"/>
           </a:p>
@@ -1241,7 +1241,7 @@
           <a:p>
             <a:fld id="{9C17CDB5-7EC3-4DB1-8593-D6DC3761AE5D}" type="datetimeFigureOut">
               <a:rPr lang="es-ES" smtClean="0"/>
-              <a:t>23/01/2019</a:t>
+              <a:t>27/01/2019</a:t>
             </a:fld>
             <a:endParaRPr lang="es-ES"/>
           </a:p>
@@ -1608,7 +1608,7 @@
           <a:p>
             <a:fld id="{9C17CDB5-7EC3-4DB1-8593-D6DC3761AE5D}" type="datetimeFigureOut">
               <a:rPr lang="es-ES" smtClean="0"/>
-              <a:t>23/01/2019</a:t>
+              <a:t>27/01/2019</a:t>
             </a:fld>
             <a:endParaRPr lang="es-ES"/>
           </a:p>
@@ -1726,7 +1726,7 @@
           <a:p>
             <a:fld id="{9C17CDB5-7EC3-4DB1-8593-D6DC3761AE5D}" type="datetimeFigureOut">
               <a:rPr lang="es-ES" smtClean="0"/>
-              <a:t>23/01/2019</a:t>
+              <a:t>27/01/2019</a:t>
             </a:fld>
             <a:endParaRPr lang="es-ES"/>
           </a:p>
@@ -1821,7 +1821,7 @@
           <a:p>
             <a:fld id="{9C17CDB5-7EC3-4DB1-8593-D6DC3761AE5D}" type="datetimeFigureOut">
               <a:rPr lang="es-ES" smtClean="0"/>
-              <a:t>23/01/2019</a:t>
+              <a:t>27/01/2019</a:t>
             </a:fld>
             <a:endParaRPr lang="es-ES"/>
           </a:p>
@@ -2098,7 +2098,7 @@
           <a:p>
             <a:fld id="{9C17CDB5-7EC3-4DB1-8593-D6DC3761AE5D}" type="datetimeFigureOut">
               <a:rPr lang="es-ES" smtClean="0"/>
-              <a:t>23/01/2019</a:t>
+              <a:t>27/01/2019</a:t>
             </a:fld>
             <a:endParaRPr lang="es-ES"/>
           </a:p>
@@ -2351,7 +2351,7 @@
           <a:p>
             <a:fld id="{9C17CDB5-7EC3-4DB1-8593-D6DC3761AE5D}" type="datetimeFigureOut">
               <a:rPr lang="es-ES" smtClean="0"/>
-              <a:t>23/01/2019</a:t>
+              <a:t>27/01/2019</a:t>
             </a:fld>
             <a:endParaRPr lang="es-ES"/>
           </a:p>
@@ -2564,7 +2564,7 @@
           <a:p>
             <a:fld id="{9C17CDB5-7EC3-4DB1-8593-D6DC3761AE5D}" type="datetimeFigureOut">
               <a:rPr lang="es-ES" smtClean="0"/>
-              <a:t>23/01/2019</a:t>
+              <a:t>27/01/2019</a:t>
             </a:fld>
             <a:endParaRPr lang="es-ES"/>
           </a:p>
@@ -2955,6 +2955,14 @@
 <file path=ppt/slides/slide1.xml><?xml version="1.0" encoding="utf-8"?>
 <p:sld xmlns:a="http://schemas.openxmlformats.org/drawingml/2006/main" xmlns:r="http://schemas.openxmlformats.org/officeDocument/2006/relationships" xmlns:p="http://schemas.openxmlformats.org/presentationml/2006/main">
   <p:cSld>
+    <p:bg>
+      <p:bgPr>
+        <a:solidFill>
+          <a:srgbClr val="FAFAFA"/>
+        </a:solidFill>
+        <a:effectLst/>
+      </p:bgPr>
+    </p:bg>
     <p:spTree>
       <p:nvGrpSpPr>
         <p:cNvPr id="1" name=""/>

</xml_diff>